<commit_message>
adding my part to the presentation
</commit_message>
<xml_diff>
--- a/Rain Man.pptx
+++ b/Rain Man.pptx
@@ -13,9 +13,11 @@
     <p:sldId id="259" r:id="rId7"/>
     <p:sldId id="260" r:id="rId8"/>
     <p:sldId id="261" r:id="rId9"/>
-    <p:sldId id="264" r:id="rId10"/>
-    <p:sldId id="265" r:id="rId11"/>
-    <p:sldId id="262" r:id="rId12"/>
+    <p:sldId id="268" r:id="rId10"/>
+    <p:sldId id="267" r:id="rId11"/>
+    <p:sldId id="264" r:id="rId12"/>
+    <p:sldId id="265" r:id="rId13"/>
+    <p:sldId id="262" r:id="rId14"/>
   </p:sldIdLst>
   <p:sldSz cx="9144000" cy="6858000" type="screen4x3"/>
   <p:notesSz cx="6858000" cy="9144000"/>
@@ -4081,135 +4083,110 @@
           <a:chExt cx="0" cy="0"/>
         </a:xfrm>
       </p:grpSpPr>
-      <p:sp>
-        <p:nvSpPr>
-          <p:cNvPr id="2" name="כותרת 1"/>
-          <p:cNvSpPr>
-            <a:spLocks noGrp="1"/>
-          </p:cNvSpPr>
-          <p:nvPr>
-            <p:ph type="title"/>
-          </p:nvPr>
-        </p:nvSpPr>
-        <p:spPr>
+      <p:pic>
+        <p:nvPicPr>
+          <p:cNvPr id="4" name="Picture 2" descr="C:\Users\Public\Pictures\0.jpg"/>
+          <p:cNvPicPr>
+            <a:picLocks noChangeAspect="1" noChangeArrowheads="1"/>
+          </p:cNvPicPr>
+          <p:nvPr/>
+        </p:nvPicPr>
+        <p:blipFill>
+          <a:blip r:embed="rId2">
+            <a:extLst>
+              <a:ext uri="{28A0092B-C50C-407E-A947-70E740481C1C}">
+                <a14:useLocalDpi xmlns:a14="http://schemas.microsoft.com/office/drawing/2010/main" val="0"/>
+              </a:ext>
+            </a:extLst>
+          </a:blip>
+          <a:srcRect/>
+          <a:stretch>
+            <a:fillRect/>
+          </a:stretch>
+        </p:blipFill>
+        <p:spPr bwMode="auto">
           <a:xfrm>
-            <a:off x="304800" y="381000"/>
-            <a:ext cx="7772400" cy="1362456"/>
-          </a:xfrm>
-        </p:spPr>
-        <p:txBody>
-          <a:bodyPr/>
-          <a:lstStyle/>
-          <a:p>
-            <a:r>
-              <a:rPr smtClean="0"/>
-              <a:t>Chall</a:t>
-            </a:r>
-            <a:r>
-              <a:rPr lang="en-US" dirty="0" smtClean="0"/>
-              <a:t>e</a:t>
-            </a:r>
-            <a:r>
-              <a:rPr smtClean="0"/>
-              <a:t>nges:</a:t>
-            </a:r>
-            <a:endParaRPr lang="en-US" dirty="0"/>
-          </a:p>
-        </p:txBody>
-      </p:sp>
-      <p:sp>
-        <p:nvSpPr>
-          <p:cNvPr id="4" name="TextBox 3"/>
-          <p:cNvSpPr txBox="1"/>
-          <p:nvPr/>
-        </p:nvSpPr>
-        <p:spPr>
-          <a:xfrm>
-            <a:off x="304800" y="1828800"/>
-            <a:ext cx="8229600" cy="2862322"/>
+            <a:off x="1371600" y="304800"/>
+            <a:ext cx="6099629" cy="6096000"/>
           </a:xfrm>
           <a:prstGeom prst="rect">
             <a:avLst/>
           </a:prstGeom>
           <a:noFill/>
-        </p:spPr>
-        <p:txBody>
-          <a:bodyPr wrap="square" rtlCol="0">
-            <a:spAutoFit/>
-          </a:bodyPr>
-          <a:lstStyle/>
-          <a:p>
-            <a:pPr marL="342900" indent="-342900">
-              <a:buAutoNum type="arabicPeriod"/>
-            </a:pPr>
-            <a:r>
-              <a:rPr lang="en-US" dirty="0" smtClean="0"/>
-              <a:t>Some of us needed to upgrade windows (or virtual machines).</a:t>
-            </a:r>
-          </a:p>
-          <a:p>
-            <a:pPr marL="342900" indent="-342900">
-              <a:buAutoNum type="arabicPeriod"/>
-            </a:pPr>
-            <a:r>
-              <a:rPr lang="en-US" dirty="0" smtClean="0"/>
-              <a:t>Getting familiar with the azure infrastructure: numerous videos and articles.</a:t>
-            </a:r>
-          </a:p>
-          <a:p>
-            <a:pPr marL="342900" indent="-342900">
-              <a:buAutoNum type="arabicPeriod"/>
-            </a:pPr>
-            <a:r>
-              <a:rPr lang="en-US" dirty="0" smtClean="0"/>
-              <a:t>Deciding the type of  tables to use ( Blob, Table storage and SQL DB).</a:t>
-            </a:r>
-          </a:p>
-          <a:p>
-            <a:pPr marL="342900" indent="-342900">
-              <a:buAutoNum type="arabicPeriod"/>
-            </a:pPr>
-            <a:r>
-              <a:rPr lang="en-US" dirty="0" smtClean="0"/>
-              <a:t>Accessing the DB with bugs in stream and Little Endean or Big Endean differences.</a:t>
-            </a:r>
-          </a:p>
-          <a:p>
-            <a:pPr marL="342900" indent="-342900">
-              <a:buAutoNum type="arabicPeriod"/>
-            </a:pPr>
-            <a:r>
-              <a:rPr lang="en-US" dirty="0" smtClean="0"/>
-              <a:t>Coordination between the 3 team mates.</a:t>
-            </a:r>
-          </a:p>
-          <a:p>
-            <a:pPr marL="342900" indent="-342900">
-              <a:buAutoNum type="arabicPeriod"/>
-            </a:pPr>
-            <a:r>
-              <a:rPr lang="en-US" dirty="0" smtClean="0"/>
-              <a:t>Source Control (GIT).</a:t>
-            </a:r>
-          </a:p>
-          <a:p>
-            <a:pPr marL="342900" indent="-342900">
-              <a:buAutoNum type="arabicPeriod" startAt="7"/>
-            </a:pPr>
-            <a:r>
-              <a:rPr lang="en-US" dirty="0" smtClean="0"/>
-              <a:t>No help regarding the use of AZUR: we contacted Microsoft help desk.</a:t>
-            </a:r>
-          </a:p>
-          <a:p>
-            <a:pPr marL="342900" indent="-342900"/>
-            <a:endParaRPr lang="en-US" dirty="0" smtClean="0"/>
-          </a:p>
-          <a:p>
-            <a:pPr marL="342900" indent="-342900">
-              <a:buAutoNum type="arabicPeriod"/>
-            </a:pPr>
-            <a:endParaRPr lang="en-US" dirty="0"/>
+          <a:extLst>
+            <a:ext uri="{909E8E84-426E-40DD-AFC4-6F175D3DCCD1}">
+              <a14:hiddenFill xmlns:a14="http://schemas.microsoft.com/office/drawing/2010/main">
+                <a:solidFill>
+                  <a:srgbClr val="FFFFFF"/>
+                </a:solidFill>
+              </a14:hiddenFill>
+            </a:ext>
+          </a:extLst>
+        </p:spPr>
+      </p:pic>
+    </p:spTree>
+    <p:extLst>
+      <p:ext uri="{BB962C8B-B14F-4D97-AF65-F5344CB8AC3E}">
+        <p14:creationId xmlns:p14="http://schemas.microsoft.com/office/powerpoint/2010/main" val="2849815269"/>
+      </p:ext>
+    </p:extLst>
+  </p:cSld>
+  <p:clrMapOvr>
+    <a:masterClrMapping/>
+  </p:clrMapOvr>
+</p:sld>
+</file>
+
+<file path=ppt/slides/slide11.xml><?xml version="1.0" encoding="utf-8"?>
+<p:sld xmlns:a="http://schemas.openxmlformats.org/drawingml/2006/main" xmlns:r="http://schemas.openxmlformats.org/officeDocument/2006/relationships" xmlns:p="http://schemas.openxmlformats.org/presentationml/2006/main">
+  <p:cSld>
+    <p:spTree>
+      <p:nvGrpSpPr>
+        <p:cNvPr id="1" name=""/>
+        <p:cNvGrpSpPr/>
+        <p:nvPr/>
+      </p:nvGrpSpPr>
+      <p:grpSpPr>
+        <a:xfrm>
+          <a:off x="0" y="0"/>
+          <a:ext cx="0" cy="0"/>
+          <a:chOff x="0" y="0"/>
+          <a:chExt cx="0" cy="0"/>
+        </a:xfrm>
+      </p:grpSpPr>
+      <p:sp>
+        <p:nvSpPr>
+          <p:cNvPr id="2" name="כותרת 1"/>
+          <p:cNvSpPr>
+            <a:spLocks noGrp="1"/>
+          </p:cNvSpPr>
+          <p:nvPr>
+            <p:ph type="title"/>
+          </p:nvPr>
+        </p:nvSpPr>
+        <p:spPr>
+          <a:xfrm>
+            <a:off x="533400" y="457200"/>
+            <a:ext cx="7772400" cy="1362456"/>
+          </a:xfrm>
+        </p:spPr>
+        <p:txBody>
+          <a:bodyPr/>
+          <a:lstStyle/>
+          <a:p>
+            <a:r>
+              <a:rPr smtClean="0">
+                <a:solidFill>
+                  <a:srgbClr val="FFFF00"/>
+                </a:solidFill>
+              </a:rPr>
+              <a:t>UI</a:t>
+            </a:r>
+            <a:endParaRPr lang="en-US" dirty="0">
+              <a:solidFill>
+                <a:srgbClr val="FFFF00"/>
+              </a:solidFill>
+            </a:endParaRPr>
           </a:p>
         </p:txBody>
       </p:sp>
@@ -4221,7 +4198,205 @@
 </p:sld>
 </file>
 
-<file path=ppt/slides/slide11.xml><?xml version="1.0" encoding="utf-8"?>
+<file path=ppt/slides/slide12.xml><?xml version="1.0" encoding="utf-8"?>
+<p:sld xmlns:a="http://schemas.openxmlformats.org/drawingml/2006/main" xmlns:r="http://schemas.openxmlformats.org/officeDocument/2006/relationships" xmlns:p="http://schemas.openxmlformats.org/presentationml/2006/main">
+  <p:cSld>
+    <p:spTree>
+      <p:nvGrpSpPr>
+        <p:cNvPr id="1" name=""/>
+        <p:cNvGrpSpPr/>
+        <p:nvPr/>
+      </p:nvGrpSpPr>
+      <p:grpSpPr>
+        <a:xfrm>
+          <a:off x="0" y="0"/>
+          <a:ext cx="0" cy="0"/>
+          <a:chOff x="0" y="0"/>
+          <a:chExt cx="0" cy="0"/>
+        </a:xfrm>
+      </p:grpSpPr>
+      <p:sp>
+        <p:nvSpPr>
+          <p:cNvPr id="2" name="כותרת 1"/>
+          <p:cNvSpPr>
+            <a:spLocks noGrp="1"/>
+          </p:cNvSpPr>
+          <p:nvPr>
+            <p:ph type="title"/>
+          </p:nvPr>
+        </p:nvSpPr>
+        <p:spPr>
+          <a:xfrm>
+            <a:off x="304800" y="381000"/>
+            <a:ext cx="7772400" cy="1362456"/>
+          </a:xfrm>
+        </p:spPr>
+        <p:txBody>
+          <a:bodyPr/>
+          <a:lstStyle/>
+          <a:p>
+            <a:r>
+              <a:rPr smtClean="0"/>
+              <a:t>Chall</a:t>
+            </a:r>
+            <a:r>
+              <a:rPr lang="en-US" dirty="0" smtClean="0"/>
+              <a:t>e</a:t>
+            </a:r>
+            <a:r>
+              <a:rPr smtClean="0"/>
+              <a:t>nges:</a:t>
+            </a:r>
+            <a:endParaRPr lang="en-US" dirty="0"/>
+          </a:p>
+        </p:txBody>
+      </p:sp>
+      <p:sp>
+        <p:nvSpPr>
+          <p:cNvPr id="4" name="TextBox 3"/>
+          <p:cNvSpPr txBox="1"/>
+          <p:nvPr/>
+        </p:nvSpPr>
+        <p:spPr>
+          <a:xfrm>
+            <a:off x="304800" y="1828800"/>
+            <a:ext cx="8229600" cy="3970318"/>
+          </a:xfrm>
+          <a:prstGeom prst="rect">
+            <a:avLst/>
+          </a:prstGeom>
+          <a:noFill/>
+        </p:spPr>
+        <p:txBody>
+          <a:bodyPr wrap="square" rtlCol="0">
+            <a:spAutoFit/>
+          </a:bodyPr>
+          <a:lstStyle/>
+          <a:p>
+            <a:pPr marL="342900" indent="-342900">
+              <a:buAutoNum type="arabicPeriod"/>
+            </a:pPr>
+            <a:r>
+              <a:rPr lang="en-US" dirty="0" smtClean="0"/>
+              <a:t>Some of us needed to upgrade windows (or virtual machines).</a:t>
+            </a:r>
+          </a:p>
+          <a:p>
+            <a:pPr marL="342900" indent="-342900">
+              <a:buAutoNum type="arabicPeriod"/>
+            </a:pPr>
+            <a:r>
+              <a:rPr lang="en-US" dirty="0" smtClean="0"/>
+              <a:t>Getting familiar with the azure infrastructure: numerous videos and articles.</a:t>
+            </a:r>
+          </a:p>
+          <a:p>
+            <a:pPr marL="342900" indent="-342900">
+              <a:buAutoNum type="arabicPeriod"/>
+            </a:pPr>
+            <a:r>
+              <a:rPr lang="en-US" dirty="0" smtClean="0"/>
+              <a:t>Deciding the type of  tables to use ( Blob, Table storage and SQL DB).</a:t>
+            </a:r>
+          </a:p>
+          <a:p>
+            <a:pPr marL="342900" indent="-342900">
+              <a:buAutoNum type="arabicPeriod"/>
+            </a:pPr>
+            <a:r>
+              <a:rPr lang="en-US" dirty="0" smtClean="0"/>
+              <a:t>Accessing the DB with bugs in stream and Little Endean or Big Endean differences.</a:t>
+            </a:r>
+          </a:p>
+          <a:p>
+            <a:pPr marL="342900" indent="-342900">
+              <a:buAutoNum type="arabicPeriod"/>
+            </a:pPr>
+            <a:r>
+              <a:rPr lang="en-US" dirty="0" smtClean="0"/>
+              <a:t>Coordination between the 3 team mates.</a:t>
+            </a:r>
+          </a:p>
+          <a:p>
+            <a:pPr marL="342900" indent="-342900">
+              <a:buAutoNum type="arabicPeriod"/>
+            </a:pPr>
+            <a:r>
+              <a:rPr lang="en-US" dirty="0" smtClean="0"/>
+              <a:t>Source Control (GIT).</a:t>
+            </a:r>
+          </a:p>
+          <a:p>
+            <a:pPr marL="342900" indent="-342900">
+              <a:buAutoNum type="arabicPeriod" startAt="7"/>
+            </a:pPr>
+            <a:r>
+              <a:rPr lang="en-US" dirty="0" smtClean="0"/>
+              <a:t>No help regarding the use of AZUR: we contacted Microsoft help desk</a:t>
+            </a:r>
+            <a:r>
+              <a:rPr lang="en-US" dirty="0" smtClean="0"/>
+              <a:t>.</a:t>
+            </a:r>
+          </a:p>
+          <a:p>
+            <a:pPr marL="342900" indent="-342900">
+              <a:buAutoNum type="arabicPeriod" startAt="7"/>
+            </a:pPr>
+            <a:r>
+              <a:rPr lang="en-US" dirty="0" smtClean="0"/>
+              <a:t>Almost no documentation regarding the python library for azure</a:t>
+            </a:r>
+          </a:p>
+          <a:p>
+            <a:pPr marL="342900" indent="-342900">
+              <a:buAutoNum type="arabicPeriod" startAt="7"/>
+            </a:pPr>
+            <a:r>
+              <a:rPr lang="en-US" dirty="0" smtClean="0"/>
+              <a:t>Human  directed radar scale</a:t>
+            </a:r>
+          </a:p>
+          <a:p>
+            <a:pPr marL="342900" indent="-342900">
+              <a:buAutoNum type="arabicPeriod" startAt="7"/>
+            </a:pPr>
+            <a:r>
+              <a:rPr lang="en-US" dirty="0" smtClean="0"/>
+              <a:t>Bad connection with the radar site</a:t>
+            </a:r>
+          </a:p>
+          <a:p>
+            <a:pPr marL="342900" indent="-342900">
+              <a:buAutoNum type="arabicPeriod" startAt="7"/>
+            </a:pPr>
+            <a:r>
+              <a:rPr lang="en-US" dirty="0" smtClean="0"/>
+              <a:t>The radar map is a “flat” map and the earth is a glob </a:t>
+            </a:r>
+            <a:endParaRPr lang="en-US" dirty="0" smtClean="0"/>
+          </a:p>
+          <a:p>
+            <a:pPr marL="342900" indent="-342900"/>
+            <a:endParaRPr lang="en-US" dirty="0" smtClean="0"/>
+          </a:p>
+          <a:p>
+            <a:pPr marL="342900" indent="-342900">
+              <a:buAutoNum type="arabicPeriod"/>
+            </a:pPr>
+            <a:endParaRPr lang="en-US" dirty="0"/>
+          </a:p>
+        </p:txBody>
+      </p:sp>
+    </p:spTree>
+  </p:cSld>
+  <p:clrMapOvr>
+    <a:masterClrMapping/>
+  </p:clrMapOvr>
+</p:sld>
+</file>
+
+<file path=ppt/slides/slide13.xml><?xml version="1.0" encoding="utf-8"?>
 <p:sld xmlns:a="http://schemas.openxmlformats.org/drawingml/2006/main" xmlns:r="http://schemas.openxmlformats.org/officeDocument/2006/relationships" xmlns:p="http://schemas.openxmlformats.org/presentationml/2006/main">
   <p:cSld>
     <p:spTree>
@@ -4554,7 +4729,6 @@
               <a:rPr lang="en-US" dirty="0" smtClean="0"/>
               <a:t>The features of our app:</a:t>
             </a:r>
-            <a:endParaRPr lang="en-US" dirty="0" smtClean="0"/>
           </a:p>
           <a:p>
             <a:pPr algn="l"/>
@@ -5285,7 +5459,7 @@
         <p:spPr>
           <a:xfrm>
             <a:off x="838200" y="3581400"/>
-            <a:ext cx="7162800" cy="1754326"/>
+            <a:ext cx="7162800" cy="2308324"/>
           </a:xfrm>
           <a:prstGeom prst="rect">
             <a:avLst/>
@@ -5308,8 +5482,24 @@
             <a:pPr marL="0" lvl="1"/>
             <a:r>
               <a:rPr lang="en-US" dirty="0" smtClean="0"/>
-              <a:t>	-hue (360 degrees. Hue in the HSB/HSL encodings of RGB picture)</a:t>
-            </a:r>
+              <a:t>	-hue (360 degrees</a:t>
+            </a:r>
+            <a:r>
+              <a:rPr lang="en-US" dirty="0" smtClean="0"/>
+              <a:t>.)</a:t>
+            </a:r>
+          </a:p>
+          <a:p>
+            <a:pPr marL="0" lvl="1"/>
+            <a:endParaRPr lang="en-US" dirty="0" smtClean="0"/>
+          </a:p>
+          <a:p>
+            <a:pPr marL="0" lvl="1"/>
+            <a:endParaRPr lang="en-US" dirty="0" smtClean="0"/>
+          </a:p>
+          <a:p>
+            <a:pPr marL="0" lvl="1"/>
+            <a:endParaRPr lang="en-US" dirty="0" smtClean="0"/>
           </a:p>
           <a:p>
             <a:pPr marL="0" lvl="1"/>
@@ -5330,6 +5520,90 @@
           </a:p>
         </p:txBody>
       </p:sp>
+      <p:sp>
+        <p:nvSpPr>
+          <p:cNvPr id="9" name="Rectangle 8"/>
+          <p:cNvSpPr/>
+          <p:nvPr/>
+        </p:nvSpPr>
+        <p:spPr>
+          <a:xfrm>
+            <a:off x="1932214" y="4225587"/>
+            <a:ext cx="3429000" cy="742950"/>
+          </a:xfrm>
+          <a:prstGeom prst="rect">
+            <a:avLst/>
+          </a:prstGeom>
+          <a:solidFill>
+            <a:schemeClr val="tx1"/>
+          </a:solidFill>
+        </p:spPr>
+        <p:style>
+          <a:lnRef idx="2">
+            <a:schemeClr val="accent1">
+              <a:shade val="50000"/>
+            </a:schemeClr>
+          </a:lnRef>
+          <a:fillRef idx="1">
+            <a:schemeClr val="accent1"/>
+          </a:fillRef>
+          <a:effectRef idx="0">
+            <a:schemeClr val="accent1"/>
+          </a:effectRef>
+          <a:fontRef idx="minor">
+            <a:schemeClr val="lt1"/>
+          </a:fontRef>
+        </p:style>
+        <p:txBody>
+          <a:bodyPr rtlCol="1" anchor="ctr"/>
+          <a:lstStyle/>
+          <a:p>
+            <a:pPr algn="ctr"/>
+            <a:endParaRPr lang="he-IL"/>
+          </a:p>
+        </p:txBody>
+      </p:sp>
+      <p:pic>
+        <p:nvPicPr>
+          <p:cNvPr id="8" name="Picture 2" descr="C:\Users\davidl\Pictures\360px-HueScale.svg.png"/>
+          <p:cNvPicPr>
+            <a:picLocks noChangeAspect="1" noChangeArrowheads="1"/>
+          </p:cNvPicPr>
+          <p:nvPr/>
+        </p:nvPicPr>
+        <p:blipFill>
+          <a:blip r:embed="rId2">
+            <a:extLst>
+              <a:ext uri="{28A0092B-C50C-407E-A947-70E740481C1C}">
+                <a14:useLocalDpi xmlns:a14="http://schemas.microsoft.com/office/drawing/2010/main" val="0"/>
+              </a:ext>
+            </a:extLst>
+          </a:blip>
+          <a:srcRect/>
+          <a:stretch>
+            <a:fillRect/>
+          </a:stretch>
+        </p:blipFill>
+        <p:spPr bwMode="auto">
+          <a:xfrm>
+            <a:off x="1924957" y="4225587"/>
+            <a:ext cx="3429000" cy="742950"/>
+          </a:xfrm>
+          <a:prstGeom prst="rect">
+            <a:avLst/>
+          </a:prstGeom>
+          <a:noFill/>
+          <a:extLst>
+            <a:ext uri="{909E8E84-426E-40DD-AFC4-6F175D3DCCD1}">
+              <a14:hiddenFill xmlns:a14="http://schemas.microsoft.com/office/drawing/2010/main">
+                <a:solidFill>
+                  <a:srgbClr val="FFFFFF"/>
+                </a:solidFill>
+              </a14:hiddenFill>
+            </a:ext>
+          </a:extLst>
+        </p:spPr>
+      </p:pic>
     </p:spTree>
   </p:cSld>
   <p:clrMapOvr>
@@ -5355,43 +5629,53 @@
           <a:chExt cx="0" cy="0"/>
         </a:xfrm>
       </p:grpSpPr>
-      <p:sp>
-        <p:nvSpPr>
-          <p:cNvPr id="2" name="כותרת 1"/>
-          <p:cNvSpPr>
-            <a:spLocks noGrp="1"/>
-          </p:cNvSpPr>
-          <p:nvPr>
-            <p:ph type="title"/>
-          </p:nvPr>
-        </p:nvSpPr>
-        <p:spPr>
+      <p:pic>
+        <p:nvPicPr>
+          <p:cNvPr id="4" name="Picture 2" descr="C:\Users\Public\Pictures\Sample Pictures\230.gif"/>
+          <p:cNvPicPr>
+            <a:picLocks noChangeAspect="1" noChangeArrowheads="1"/>
+          </p:cNvPicPr>
+          <p:nvPr/>
+        </p:nvPicPr>
+        <p:blipFill>
+          <a:blip r:embed="rId2">
+            <a:extLst>
+              <a:ext uri="{28A0092B-C50C-407E-A947-70E740481C1C}">
+                <a14:useLocalDpi xmlns:a14="http://schemas.microsoft.com/office/drawing/2010/main" val="0"/>
+              </a:ext>
+            </a:extLst>
+          </a:blip>
+          <a:srcRect/>
+          <a:stretch>
+            <a:fillRect/>
+          </a:stretch>
+        </p:blipFill>
+        <p:spPr bwMode="auto">
           <a:xfrm>
-            <a:off x="533400" y="457200"/>
-            <a:ext cx="7772400" cy="1362456"/>
-          </a:xfrm>
-        </p:spPr>
-        <p:txBody>
-          <a:bodyPr/>
-          <a:lstStyle/>
-          <a:p>
-            <a:r>
-              <a:rPr smtClean="0">
+            <a:off x="1244600" y="304800"/>
+            <a:ext cx="6096000" cy="6096000"/>
+          </a:xfrm>
+          <a:prstGeom prst="rect">
+            <a:avLst/>
+          </a:prstGeom>
+          <a:noFill/>
+          <a:extLst>
+            <a:ext uri="{909E8E84-426E-40DD-AFC4-6F175D3DCCD1}">
+              <a14:hiddenFill xmlns:a14="http://schemas.microsoft.com/office/drawing/2010/main">
                 <a:solidFill>
-                  <a:srgbClr val="FFFF00"/>
+                  <a:srgbClr val="FFFFFF"/>
                 </a:solidFill>
-              </a:rPr>
-              <a:t>UI</a:t>
-            </a:r>
-            <a:endParaRPr lang="en-US" dirty="0">
-              <a:solidFill>
-                <a:srgbClr val="FFFF00"/>
-              </a:solidFill>
-            </a:endParaRPr>
-          </a:p>
-        </p:txBody>
-      </p:sp>
+              </a14:hiddenFill>
+            </a:ext>
+          </a:extLst>
+        </p:spPr>
+      </p:pic>
     </p:spTree>
+    <p:extLst>
+      <p:ext uri="{BB962C8B-B14F-4D97-AF65-F5344CB8AC3E}">
+        <p14:creationId xmlns:p14="http://schemas.microsoft.com/office/powerpoint/2010/main" val="254734702"/>
+      </p:ext>
+    </p:extLst>
   </p:cSld>
   <p:clrMapOvr>
     <a:masterClrMapping/>

</xml_diff>